<commit_message>
Build 0.0.4 Staging Updates
</commit_message>
<xml_diff>
--- a/docs/Waukesha Week 10.pptx
+++ b/docs/Waukesha Week 10.pptx
@@ -7326,6 +7326,28 @@
             </a:r>
           </a:p>
           <a:p>
+            <a:pPr lvl="1"/>
+            <a:r>
+              <a:rPr lang="en-US" dirty="0">
+                <a:solidFill>
+                  <a:srgbClr val="FFFF00"/>
+                </a:solidFill>
+              </a:rPr>
+              <a:t>Manage BB Courses – Added in View for Additional Teachers</a:t>
+            </a:r>
+          </a:p>
+          <a:p>
+            <a:pPr lvl="1"/>
+            <a:r>
+              <a:rPr lang="en-US" dirty="0">
+                <a:solidFill>
+                  <a:srgbClr val="FFFF00"/>
+                </a:solidFill>
+              </a:rPr>
+              <a:t>Custom Messages – Is there a File and where located?</a:t>
+            </a:r>
+          </a:p>
+          <a:p>
             <a:endParaRPr lang="en-US" dirty="0">
               <a:solidFill>
                 <a:srgbClr val="FFFF00"/>
@@ -8286,20 +8308,12 @@
           <a:p>
             <a:pPr lvl="1"/>
             <a:r>
-              <a:rPr lang="en-US">
+              <a:rPr lang="en-US" dirty="0">
                 <a:solidFill>
                   <a:srgbClr val="FFFF00"/>
                 </a:solidFill>
               </a:rPr>
-              <a:t>Discuss </a:t>
-            </a:r>
-            <a:r>
-              <a:rPr lang="en-US" dirty="0">
-                <a:solidFill>
-                  <a:srgbClr val="FFFF00"/>
-                </a:solidFill>
-              </a:rPr>
-              <a:t>“Admin” Role</a:t>
+              <a:t>Discuss “Admin” Role</a:t>
             </a:r>
           </a:p>
           <a:p>

</xml_diff>